<commit_message>
add dbcAmplicons bioiformatics markdown
</commit_message>
<xml_diff>
--- a/dbcAmplicons/dbcAmplicons_Amplicons.pptx
+++ b/dbcAmplicons/dbcAmplicons_Amplicons.pptx
@@ -6684,8 +6684,8 @@
         </p:nvSpPr>
         <p:spPr>
           <a:xfrm>
-            <a:off x="3160450" y="1311786"/>
-            <a:ext cx="5667028" cy="726479"/>
+            <a:off x="3160449" y="1311786"/>
+            <a:ext cx="7005391" cy="726479"/>
           </a:xfrm>
           <a:prstGeom prst="rect">
             <a:avLst/>
@@ -6761,7 +6761,13 @@
       </p:sp>
       <p:grpSp>
         <p:nvGrpSpPr>
-          <p:cNvPr id="2" name="Group 1"/>
+          <p:cNvPr id="11" name="Group 10">
+            <a:extLst>
+              <a:ext uri="{FF2B5EF4-FFF2-40B4-BE49-F238E27FC236}">
+                <a16:creationId xmlns:a16="http://schemas.microsoft.com/office/drawing/2014/main" id="{30BA5CA9-7A6E-8546-B9AE-9E8DBA3C72A7}"/>
+              </a:ext>
+            </a:extLst>
+          </p:cNvPr>
           <p:cNvGrpSpPr/>
           <p:nvPr/>
         </p:nvGrpSpPr>
@@ -6769,8 +6775,8 @@
           <a:xfrm>
             <a:off x="1185153" y="1766494"/>
             <a:ext cx="8089627" cy="4897314"/>
-            <a:chOff x="176525" y="2105950"/>
-            <a:chExt cx="3718314" cy="3791050"/>
+            <a:chOff x="1185153" y="1766494"/>
+            <a:chExt cx="8089627" cy="4897314"/>
           </a:xfrm>
         </p:grpSpPr>
         <p:grpSp>
@@ -6781,8 +6787,8 @@
           </p:nvGrpSpPr>
           <p:grpSpPr>
             <a:xfrm>
-              <a:off x="176525" y="2105950"/>
-              <a:ext cx="3718314" cy="1844000"/>
+              <a:off x="1185153" y="1766494"/>
+              <a:ext cx="8089627" cy="2382097"/>
               <a:chOff x="176525" y="1248700"/>
               <a:chExt cx="3718314" cy="1844000"/>
             </a:xfrm>
@@ -6860,8 +6866,8 @@
           </p:nvGrpSpPr>
           <p:grpSpPr>
             <a:xfrm>
-              <a:off x="176525" y="4053000"/>
-              <a:ext cx="3718314" cy="1844000"/>
+              <a:off x="1185153" y="4281711"/>
+              <a:ext cx="8089627" cy="2382097"/>
               <a:chOff x="100325" y="3092700"/>
               <a:chExt cx="3718314" cy="1844000"/>
             </a:xfrm>
@@ -6940,8 +6946,8 @@
         </p:nvSpPr>
         <p:spPr>
           <a:xfrm>
-            <a:off x="9562220" y="2490921"/>
-            <a:ext cx="678391" cy="369332"/>
+            <a:off x="9274780" y="2490921"/>
+            <a:ext cx="1193928" cy="369332"/>
           </a:xfrm>
           <a:prstGeom prst="rect">
             <a:avLst/>
@@ -6972,8 +6978,8 @@
         </p:nvSpPr>
         <p:spPr>
           <a:xfrm>
-            <a:off x="9475658" y="5136342"/>
-            <a:ext cx="764953" cy="369332"/>
+            <a:off x="9274780" y="5136342"/>
+            <a:ext cx="1193928" cy="369332"/>
           </a:xfrm>
           <a:prstGeom prst="rect">
             <a:avLst/>
@@ -7111,7 +7117,7 @@
         </p:nvCxnSpPr>
         <p:spPr>
           <a:xfrm flipH="1">
-            <a:off x="5229967" y="2610434"/>
+            <a:off x="5229968" y="2610434"/>
             <a:ext cx="417757" cy="65153"/>
           </a:xfrm>
           <a:prstGeom prst="straightConnector1">
@@ -7144,8 +7150,8 @@
         </p:nvSpPr>
         <p:spPr>
           <a:xfrm>
-            <a:off x="5438845" y="2171385"/>
-            <a:ext cx="1662723" cy="369332"/>
+            <a:off x="5647723" y="2009650"/>
+            <a:ext cx="2406431" cy="369332"/>
           </a:xfrm>
           <a:prstGeom prst="rect">
             <a:avLst/>
@@ -7159,7 +7165,7 @@
           <a:lstStyle/>
           <a:p>
             <a:r>
-              <a:rPr lang="en-US"/>
+              <a:rPr lang="en-US" dirty="0"/>
               <a:t>Unused primer</a:t>
             </a:r>
           </a:p>
@@ -7173,8 +7179,8 @@
         </p:nvSpPr>
         <p:spPr>
           <a:xfrm>
-            <a:off x="6620485" y="4490011"/>
-            <a:ext cx="1271587" cy="646331"/>
+            <a:off x="6663144" y="4516957"/>
+            <a:ext cx="1571893" cy="646331"/>
           </a:xfrm>
           <a:prstGeom prst="rect">
             <a:avLst/>
@@ -7189,11 +7195,7 @@
           <a:p>
             <a:r>
               <a:rPr lang="en-US" dirty="0"/>
-              <a:t>Template </a:t>
-            </a:r>
-            <a:r>
-              <a:rPr lang="en-US"/>
-              <a:t>of interest</a:t>
+              <a:t>Template of interest</a:t>
             </a:r>
           </a:p>
         </p:txBody>
@@ -12218,9 +12220,9 @@
         <p:grpSpPr>
           <a:xfrm>
             <a:off x="1371600" y="2076590"/>
-            <a:ext cx="9530860" cy="4542866"/>
+            <a:ext cx="9530861" cy="4542866"/>
             <a:chOff x="1371600" y="2076590"/>
-            <a:chExt cx="9530860" cy="4542866"/>
+            <a:chExt cx="9530861" cy="4542866"/>
           </a:xfrm>
         </p:grpSpPr>
         <p:sp>
@@ -12245,17 +12247,17 @@
             </a:ln>
             <a:extLst>
               <a:ext uri="{FAA26D3D-D897-4be2-8F04-BA451C77F1D7}">
-                <ma14:placeholderFlag xmlns="" xmlns:ma14="http://schemas.microsoft.com/office/mac/drawingml/2011/main" val="1"/>
+                <ma14:placeholderFlag xmlns:ma14="http://schemas.microsoft.com/office/mac/drawingml/2011/main" xmlns="" val="1"/>
               </a:ext>
               <a:ext uri="{909E8E84-426E-40dd-AFC4-6F175D3DCCD1}">
-                <a14:hiddenFill xmlns:a14="http://schemas.microsoft.com/office/drawing/2010/main" xmlns="">
+                <a14:hiddenFill xmlns="" xmlns:a14="http://schemas.microsoft.com/office/drawing/2010/main">
                   <a:solidFill>
                     <a:srgbClr val="FFFFFF"/>
                   </a:solidFill>
                 </a14:hiddenFill>
               </a:ext>
               <a:ext uri="{91240B29-F687-4f45-9708-019B960494DF}">
-                <a14:hiddenLine xmlns:a14="http://schemas.microsoft.com/office/drawing/2010/main" xmlns="" w="9525">
+                <a14:hiddenLine xmlns="" xmlns:a14="http://schemas.microsoft.com/office/drawing/2010/main" w="9525">
                   <a:solidFill>
                     <a:srgbClr val="000000"/>
                   </a:solidFill>
@@ -12699,8 +12701,8 @@
           </p:nvSpPr>
           <p:spPr>
             <a:xfrm>
-              <a:off x="3675185" y="3105515"/>
-              <a:ext cx="5376005" cy="400110"/>
+              <a:off x="2864277" y="3126575"/>
+              <a:ext cx="6816969" cy="400110"/>
             </a:xfrm>
             <a:prstGeom prst="rect">
               <a:avLst/>
@@ -13479,8 +13481,8 @@
           </p:nvSpPr>
           <p:spPr>
             <a:xfrm>
-              <a:off x="2006479" y="5788459"/>
-              <a:ext cx="8895981" cy="830997"/>
+              <a:off x="1524001" y="5788459"/>
+              <a:ext cx="9378460" cy="830997"/>
             </a:xfrm>
             <a:prstGeom prst="rect">
               <a:avLst/>
@@ -14021,14 +14023,14 @@
           </a:ln>
           <a:extLst>
             <a:ext uri="{909E8E84-426E-40dd-AFC4-6F175D3DCCD1}">
-              <a14:hiddenFill xmlns:a14="http://schemas.microsoft.com/office/drawing/2010/main" xmlns="">
+              <a14:hiddenFill xmlns="" xmlns:a14="http://schemas.microsoft.com/office/drawing/2010/main">
                 <a:solidFill>
                   <a:srgbClr val="FFFFFF"/>
                 </a:solidFill>
               </a14:hiddenFill>
             </a:ext>
             <a:ext uri="{91240B29-F687-4f45-9708-019B960494DF}">
-              <a14:hiddenLine xmlns:a14="http://schemas.microsoft.com/office/drawing/2010/main" xmlns="" w="9525">
+              <a14:hiddenLine xmlns="" xmlns:a14="http://schemas.microsoft.com/office/drawing/2010/main" w="9525">
                 <a:solidFill>
                   <a:srgbClr val="000000"/>
                 </a:solidFill>

</xml_diff>